<commit_message>
Modified - Removed presenter name
</commit_message>
<xml_diff>
--- a/8. Encryption in Azure/Artifacts/Virtual Machine Encryption.pptx
+++ b/8. Encryption in Azure/Artifacts/Virtual Machine Encryption.pptx
@@ -6567,7 +6567,7 @@
               <a:rPr lang="en-US" smtClean="0">
                 <a:latin typeface="Segoe UI" pitchFamily="34" charset="0"/>
               </a:rPr>
-              <a:t>12/9/21 10:50 PM</a:t>
+              <a:t>2/2/22 3:32 PM</a:t>
             </a:fld>
             <a:endParaRPr lang="en-US" dirty="0">
               <a:latin typeface="Segoe UI" pitchFamily="34" charset="0"/>
@@ -6845,7 +6845,7 @@
           <a:p>
             <a:fld id="{386CE63F-9E7F-4C04-9D0D-FCA25A8E9E86}" type="datetime8">
               <a:rPr lang="en-US" smtClean="0"/>
-              <a:t>12/9/21 10:50 PM</a:t>
+              <a:t>2/2/22 3:31 PM</a:t>
             </a:fld>
             <a:endParaRPr lang="en-US" dirty="0"/>
           </a:p>
@@ -7212,7 +7212,7 @@
           <a:p>
             <a:fld id="{3619146B-24F9-441E-A368-DB3B5A84C1D4}" type="datetime8">
               <a:rPr lang="en-US" smtClean="0"/>
-              <a:t>12/9/21 10:50 PM</a:t>
+              <a:t>2/2/22 3:31 PM</a:t>
             </a:fld>
             <a:endParaRPr lang="en-US" dirty="0"/>
           </a:p>
@@ -7381,7 +7381,7 @@
           <a:p>
             <a:fld id="{9427A7F7-BB1E-479D-AFAA-B52F4D0C99F2}" type="datetime8">
               <a:rPr lang="en-US" smtClean="0"/>
-              <a:t>12/9/21 10:50 PM</a:t>
+              <a:t>2/2/22 3:31 PM</a:t>
             </a:fld>
             <a:endParaRPr lang="en-US" dirty="0"/>
           </a:p>
@@ -7550,7 +7550,7 @@
           <a:p>
             <a:fld id="{9427A7F7-BB1E-479D-AFAA-B52F4D0C99F2}" type="datetime8">
               <a:rPr lang="en-US" smtClean="0"/>
-              <a:t>12/9/21 10:50 PM</a:t>
+              <a:t>2/2/22 3:31 PM</a:t>
             </a:fld>
             <a:endParaRPr lang="en-US" dirty="0"/>
           </a:p>
@@ -7719,7 +7719,7 @@
           <a:p>
             <a:fld id="{9427A7F7-BB1E-479D-AFAA-B52F4D0C99F2}" type="datetime8">
               <a:rPr lang="en-US" smtClean="0"/>
-              <a:t>12/9/21 10:50 PM</a:t>
+              <a:t>2/2/22 3:32 PM</a:t>
             </a:fld>
             <a:endParaRPr lang="en-US" dirty="0"/>
           </a:p>
@@ -7888,7 +7888,7 @@
           <a:p>
             <a:fld id="{9427A7F7-BB1E-479D-AFAA-B52F4D0C99F2}" type="datetime8">
               <a:rPr lang="en-US" smtClean="0"/>
-              <a:t>12/9/21 10:50 PM</a:t>
+              <a:t>2/2/22 3:32 PM</a:t>
             </a:fld>
             <a:endParaRPr lang="en-US" dirty="0"/>
           </a:p>
@@ -8057,7 +8057,7 @@
           <a:p>
             <a:fld id="{9427A7F7-BB1E-479D-AFAA-B52F4D0C99F2}" type="datetime8">
               <a:rPr lang="en-US" smtClean="0"/>
-              <a:t>12/9/21 10:50 PM</a:t>
+              <a:t>2/2/22 3:32 PM</a:t>
             </a:fld>
             <a:endParaRPr lang="en-US" dirty="0"/>
           </a:p>
@@ -8226,7 +8226,7 @@
           <a:p>
             <a:fld id="{9427A7F7-BB1E-479D-AFAA-B52F4D0C99F2}" type="datetime8">
               <a:rPr lang="en-US" smtClean="0"/>
-              <a:t>12/9/21 10:50 PM</a:t>
+              <a:t>2/2/22 3:32 PM</a:t>
             </a:fld>
             <a:endParaRPr lang="en-US" dirty="0"/>
           </a:p>
@@ -15485,46 +15485,6 @@
               <a:rPr lang="en-US" dirty="0"/>
               <a:t>Virtual Machine Encryption</a:t>
             </a:r>
-          </a:p>
-        </p:txBody>
-      </p:sp>
-      <p:sp>
-        <p:nvSpPr>
-          <p:cNvPr id="5" name="Text Placeholder 4"/>
-          <p:cNvSpPr>
-            <a:spLocks noGrp="1"/>
-          </p:cNvSpPr>
-          <p:nvPr>
-            <p:ph type="body" sz="quarter" idx="12"/>
-          </p:nvPr>
-        </p:nvSpPr>
-        <p:spPr>
-          <a:xfrm>
-            <a:off x="584200" y="3962400"/>
-            <a:ext cx="9144000" cy="923330"/>
-          </a:xfrm>
-        </p:spPr>
-        <p:txBody>
-          <a:bodyPr/>
-          <a:lstStyle/>
-          <a:p>
-            <a:r>
-              <a:rPr lang="en-US" dirty="0"/>
-              <a:t>Matt Felton</a:t>
-            </a:r>
-          </a:p>
-          <a:p>
-            <a:r>
-              <a:rPr lang="en-US" dirty="0"/>
-              <a:t>Cloud Solution Architect</a:t>
-            </a:r>
-          </a:p>
-          <a:p>
-            <a:r>
-              <a:rPr lang="en-US"/>
-              <a:t>Last updated 8/1/2021</a:t>
-            </a:r>
-            <a:endParaRPr lang="en-US" dirty="0"/>
           </a:p>
         </p:txBody>
       </p:sp>
@@ -19109,9 +19069,12 @@
 </file>
 
 <file path=customXml/item1.xml><?xml version="1.0" encoding="utf-8"?>
-<p:properties xmlns:p="http://schemas.microsoft.com/office/2006/metadata/properties" xmlns:xsi="http://www.w3.org/2001/XMLSchema-instance" xmlns:pc="http://schemas.microsoft.com/office/infopath/2007/PartnerControls">
-  <documentManagement/>
-</p:properties>
+<?mso-contentType ?>
+<FormTemplates xmlns="http://schemas.microsoft.com/sharepoint/v3/contenttype/forms">
+  <Display>DocumentLibraryForm</Display>
+  <Edit>DocumentLibraryForm</Edit>
+  <New>DocumentLibraryForm</New>
+</FormTemplates>
 </file>
 
 <file path=customXml/item2.xml><?xml version="1.0" encoding="utf-8"?>
@@ -19326,27 +19289,15 @@
 </file>
 
 <file path=customXml/item3.xml><?xml version="1.0" encoding="utf-8"?>
-<?mso-contentType ?>
-<FormTemplates xmlns="http://schemas.microsoft.com/sharepoint/v3/contenttype/forms">
-  <Display>DocumentLibraryForm</Display>
-  <Edit>DocumentLibraryForm</Edit>
-  <New>DocumentLibraryForm</New>
-</FormTemplates>
+<p:properties xmlns:p="http://schemas.microsoft.com/office/2006/metadata/properties" xmlns:xsi="http://www.w3.org/2001/XMLSchema-instance" xmlns:pc="http://schemas.microsoft.com/office/infopath/2007/PartnerControls">
+  <documentManagement/>
+</p:properties>
 </file>
 
 <file path=customXml/itemProps1.xml><?xml version="1.0" encoding="utf-8"?>
-<ds:datastoreItem xmlns:ds="http://schemas.openxmlformats.org/officeDocument/2006/customXml" ds:itemID="{556FB2F1-418F-4174-8BE9-14A4D3AA3278}">
+<ds:datastoreItem xmlns:ds="http://schemas.openxmlformats.org/officeDocument/2006/customXml" ds:itemID="{4F8864C9-26CB-45F0-ADBB-40483FA6D018}">
   <ds:schemaRefs>
-    <ds:schemaRef ds:uri="aa7f1ac7-8bbb-4f15-8963-cd0d4c8062ce"/>
-    <ds:schemaRef ds:uri="41702965-b95a-4379-b46a-5d931a00bdfb"/>
-    <ds:schemaRef ds:uri="http://purl.org/dc/elements/1.1/"/>
-    <ds:schemaRef ds:uri="http://www.w3.org/XML/1998/namespace"/>
-    <ds:schemaRef ds:uri="http://schemas.openxmlformats.org/package/2006/metadata/core-properties"/>
-    <ds:schemaRef ds:uri="http://purl.org/dc/terms/"/>
-    <ds:schemaRef ds:uri="http://schemas.microsoft.com/office/2006/documentManagement/types"/>
-    <ds:schemaRef ds:uri="http://schemas.microsoft.com/office/infopath/2007/PartnerControls"/>
-    <ds:schemaRef ds:uri="http://schemas.microsoft.com/office/2006/metadata/properties"/>
-    <ds:schemaRef ds:uri="http://purl.org/dc/dcmitype/"/>
+    <ds:schemaRef ds:uri="http://schemas.microsoft.com/sharepoint/v3/contenttype/forms"/>
   </ds:schemaRefs>
 </ds:datastoreItem>
 </file>
@@ -19371,9 +19322,18 @@
 </file>
 
 <file path=customXml/itemProps3.xml><?xml version="1.0" encoding="utf-8"?>
-<ds:datastoreItem xmlns:ds="http://schemas.openxmlformats.org/officeDocument/2006/customXml" ds:itemID="{4F8864C9-26CB-45F0-ADBB-40483FA6D018}">
+<ds:datastoreItem xmlns:ds="http://schemas.openxmlformats.org/officeDocument/2006/customXml" ds:itemID="{556FB2F1-418F-4174-8BE9-14A4D3AA3278}">
   <ds:schemaRefs>
-    <ds:schemaRef ds:uri="http://schemas.microsoft.com/sharepoint/v3/contenttype/forms"/>
+    <ds:schemaRef ds:uri="aa7f1ac7-8bbb-4f15-8963-cd0d4c8062ce"/>
+    <ds:schemaRef ds:uri="41702965-b95a-4379-b46a-5d931a00bdfb"/>
+    <ds:schemaRef ds:uri="http://purl.org/dc/elements/1.1/"/>
+    <ds:schemaRef ds:uri="http://www.w3.org/XML/1998/namespace"/>
+    <ds:schemaRef ds:uri="http://schemas.openxmlformats.org/package/2006/metadata/core-properties"/>
+    <ds:schemaRef ds:uri="http://purl.org/dc/terms/"/>
+    <ds:schemaRef ds:uri="http://schemas.microsoft.com/office/2006/documentManagement/types"/>
+    <ds:schemaRef ds:uri="http://schemas.microsoft.com/office/infopath/2007/PartnerControls"/>
+    <ds:schemaRef ds:uri="http://schemas.microsoft.com/office/2006/metadata/properties"/>
+    <ds:schemaRef ds:uri="http://purl.org/dc/dcmitype/"/>
   </ds:schemaRefs>
 </ds:datastoreItem>
 </file>

</xml_diff>

<commit_message>
Modified - Updated RACI
</commit_message>
<xml_diff>
--- a/8. Encryption in Azure/Artifacts/Virtual Machine Encryption.pptx
+++ b/8. Encryption in Azure/Artifacts/Virtual Machine Encryption.pptx
@@ -6567,7 +6567,7 @@
               <a:rPr lang="en-US" smtClean="0">
                 <a:latin typeface="Segoe UI" pitchFamily="34" charset="0"/>
               </a:rPr>
-              <a:t>2/2/22 3:32 PM</a:t>
+              <a:t>2/4/22 2:45 PM</a:t>
             </a:fld>
             <a:endParaRPr lang="en-US" dirty="0">
               <a:latin typeface="Segoe UI" pitchFamily="34" charset="0"/>
@@ -6845,7 +6845,7 @@
           <a:p>
             <a:fld id="{386CE63F-9E7F-4C04-9D0D-FCA25A8E9E86}" type="datetime8">
               <a:rPr lang="en-US" smtClean="0"/>
-              <a:t>2/2/22 3:31 PM</a:t>
+              <a:t>2/4/22 2:43 PM</a:t>
             </a:fld>
             <a:endParaRPr lang="en-US" dirty="0"/>
           </a:p>
@@ -7212,7 +7212,7 @@
           <a:p>
             <a:fld id="{3619146B-24F9-441E-A368-DB3B5A84C1D4}" type="datetime8">
               <a:rPr lang="en-US" smtClean="0"/>
-              <a:t>2/2/22 3:31 PM</a:t>
+              <a:t>2/4/22 2:43 PM</a:t>
             </a:fld>
             <a:endParaRPr lang="en-US" dirty="0"/>
           </a:p>
@@ -7381,7 +7381,7 @@
           <a:p>
             <a:fld id="{9427A7F7-BB1E-479D-AFAA-B52F4D0C99F2}" type="datetime8">
               <a:rPr lang="en-US" smtClean="0"/>
-              <a:t>2/2/22 3:31 PM</a:t>
+              <a:t>2/4/22 2:43 PM</a:t>
             </a:fld>
             <a:endParaRPr lang="en-US" dirty="0"/>
           </a:p>
@@ -7550,7 +7550,7 @@
           <a:p>
             <a:fld id="{9427A7F7-BB1E-479D-AFAA-B52F4D0C99F2}" type="datetime8">
               <a:rPr lang="en-US" smtClean="0"/>
-              <a:t>2/2/22 3:31 PM</a:t>
+              <a:t>2/4/22 2:44 PM</a:t>
             </a:fld>
             <a:endParaRPr lang="en-US" dirty="0"/>
           </a:p>
@@ -7719,7 +7719,7 @@
           <a:p>
             <a:fld id="{9427A7F7-BB1E-479D-AFAA-B52F4D0C99F2}" type="datetime8">
               <a:rPr lang="en-US" smtClean="0"/>
-              <a:t>2/2/22 3:32 PM</a:t>
+              <a:t>2/4/22 2:44 PM</a:t>
             </a:fld>
             <a:endParaRPr lang="en-US" dirty="0"/>
           </a:p>
@@ -7888,7 +7888,7 @@
           <a:p>
             <a:fld id="{9427A7F7-BB1E-479D-AFAA-B52F4D0C99F2}" type="datetime8">
               <a:rPr lang="en-US" smtClean="0"/>
-              <a:t>2/2/22 3:32 PM</a:t>
+              <a:t>2/4/22 2:45 PM</a:t>
             </a:fld>
             <a:endParaRPr lang="en-US" dirty="0"/>
           </a:p>
@@ -8057,7 +8057,7 @@
           <a:p>
             <a:fld id="{9427A7F7-BB1E-479D-AFAA-B52F4D0C99F2}" type="datetime8">
               <a:rPr lang="en-US" smtClean="0"/>
-              <a:t>2/2/22 3:32 PM</a:t>
+              <a:t>2/4/22 2:45 PM</a:t>
             </a:fld>
             <a:endParaRPr lang="en-US" dirty="0"/>
           </a:p>
@@ -8226,7 +8226,7 @@
           <a:p>
             <a:fld id="{9427A7F7-BB1E-479D-AFAA-B52F4D0C99F2}" type="datetime8">
               <a:rPr lang="en-US" smtClean="0"/>
-              <a:t>2/2/22 3:32 PM</a:t>
+              <a:t>2/4/22 2:43 PM</a:t>
             </a:fld>
             <a:endParaRPr lang="en-US" dirty="0"/>
           </a:p>
@@ -19069,15 +19069,6 @@
 </file>
 
 <file path=customXml/item1.xml><?xml version="1.0" encoding="utf-8"?>
-<?mso-contentType ?>
-<FormTemplates xmlns="http://schemas.microsoft.com/sharepoint/v3/contenttype/forms">
-  <Display>DocumentLibraryForm</Display>
-  <Edit>DocumentLibraryForm</Edit>
-  <New>DocumentLibraryForm</New>
-</FormTemplates>
-</file>
-
-<file path=customXml/item2.xml><?xml version="1.0" encoding="utf-8"?>
 <ct:contentTypeSchema xmlns:ct="http://schemas.microsoft.com/office/2006/metadata/contentType" xmlns:ma="http://schemas.microsoft.com/office/2006/metadata/properties/metaAttributes" ct:_="" ma:_="" ma:contentTypeName="Document" ma:contentTypeID="0x0101001111ADC00254DE41A04749877178181E" ma:contentTypeVersion="11" ma:contentTypeDescription="Create a new document." ma:contentTypeScope="" ma:versionID="22b0ffa551a8eb55f619d65d31d8f057">
   <xsd:schema xmlns:xsd="http://www.w3.org/2001/XMLSchema" xmlns:xs="http://www.w3.org/2001/XMLSchema" xmlns:p="http://schemas.microsoft.com/office/2006/metadata/properties" xmlns:ns3="41702965-b95a-4379-b46a-5d931a00bdfb" xmlns:ns4="aa7f1ac7-8bbb-4f15-8963-cd0d4c8062ce" targetNamespace="http://schemas.microsoft.com/office/2006/metadata/properties" ma:root="true" ma:fieldsID="c4bb29fa7dec31b6e89dd9e69c6d67c7" ns3:_="" ns4:_="">
     <xsd:import namespace="41702965-b95a-4379-b46a-5d931a00bdfb"/>
@@ -19288,6 +19279,15 @@
 </ct:contentTypeSchema>
 </file>
 
+<file path=customXml/item2.xml><?xml version="1.0" encoding="utf-8"?>
+<?mso-contentType ?>
+<FormTemplates xmlns="http://schemas.microsoft.com/sharepoint/v3/contenttype/forms">
+  <Display>DocumentLibraryForm</Display>
+  <Edit>DocumentLibraryForm</Edit>
+  <New>DocumentLibraryForm</New>
+</FormTemplates>
+</file>
+
 <file path=customXml/item3.xml><?xml version="1.0" encoding="utf-8"?>
 <p:properties xmlns:p="http://schemas.microsoft.com/office/2006/metadata/properties" xmlns:xsi="http://www.w3.org/2001/XMLSchema-instance" xmlns:pc="http://schemas.microsoft.com/office/infopath/2007/PartnerControls">
   <documentManagement/>
@@ -19295,14 +19295,6 @@
 </file>
 
 <file path=customXml/itemProps1.xml><?xml version="1.0" encoding="utf-8"?>
-<ds:datastoreItem xmlns:ds="http://schemas.openxmlformats.org/officeDocument/2006/customXml" ds:itemID="{4F8864C9-26CB-45F0-ADBB-40483FA6D018}">
-  <ds:schemaRefs>
-    <ds:schemaRef ds:uri="http://schemas.microsoft.com/sharepoint/v3/contenttype/forms"/>
-  </ds:schemaRefs>
-</ds:datastoreItem>
-</file>
-
-<file path=customXml/itemProps2.xml><?xml version="1.0" encoding="utf-8"?>
 <ds:datastoreItem xmlns:ds="http://schemas.openxmlformats.org/officeDocument/2006/customXml" ds:itemID="{D8B7D216-D964-4CB8-9E88-41D30A587B00}">
   <ds:schemaRefs>
     <ds:schemaRef ds:uri="http://schemas.microsoft.com/office/2006/metadata/contentType"/>
@@ -19317,6 +19309,14 @@
     <ds:schemaRef ds:uri="http://purl.org/dc/elements/1.1/"/>
     <ds:schemaRef ds:uri="http://purl.org/dc/terms/"/>
     <ds:schemaRef ds:uri="http://schemas.microsoft.com/internal/obd"/>
+  </ds:schemaRefs>
+</ds:datastoreItem>
+</file>
+
+<file path=customXml/itemProps2.xml><?xml version="1.0" encoding="utf-8"?>
+<ds:datastoreItem xmlns:ds="http://schemas.openxmlformats.org/officeDocument/2006/customXml" ds:itemID="{4F8864C9-26CB-45F0-ADBB-40483FA6D018}">
+  <ds:schemaRefs>
+    <ds:schemaRef ds:uri="http://schemas.microsoft.com/sharepoint/v3/contenttype/forms"/>
   </ds:schemaRefs>
 </ds:datastoreItem>
 </file>

</xml_diff>

<commit_message>
Modified - Updated encryption deck to include jasset's summary image
</commit_message>
<xml_diff>
--- a/8. Encryption in Azure/Artifacts/Virtual Machine Encryption.pptx
+++ b/8. Encryption in Azure/Artifacts/Virtual Machine Encryption.pptx
@@ -6,10 +6,10 @@
     <p:sldMasterId id="2147484642" r:id="rId5"/>
   </p:sldMasterIdLst>
   <p:notesMasterIdLst>
-    <p:notesMasterId r:id="rId13"/>
+    <p:notesMasterId r:id="rId14"/>
   </p:notesMasterIdLst>
   <p:handoutMasterIdLst>
-    <p:handoutMasterId r:id="rId14"/>
+    <p:handoutMasterId r:id="rId15"/>
   </p:handoutMasterIdLst>
   <p:sldIdLst>
     <p:sldId id="1854" r:id="rId6"/>
@@ -18,7 +18,8 @@
     <p:sldId id="1873" r:id="rId9"/>
     <p:sldId id="1872" r:id="rId10"/>
     <p:sldId id="1874" r:id="rId11"/>
-    <p:sldId id="1875" r:id="rId12"/>
+    <p:sldId id="1877" r:id="rId12"/>
+    <p:sldId id="1875" r:id="rId13"/>
   </p:sldIdLst>
   <p:sldSz cx="12192000" cy="6858000"/>
   <p:notesSz cx="6858000" cy="9144000"/>
@@ -128,6 +129,7 @@
             <p14:sldId id="1873"/>
             <p14:sldId id="1872"/>
             <p14:sldId id="1874"/>
+            <p14:sldId id="1877"/>
             <p14:sldId id="1875"/>
           </p14:sldIdLst>
         </p14:section>
@@ -6567,7 +6569,7 @@
               <a:rPr lang="en-US" smtClean="0">
                 <a:latin typeface="Segoe UI" pitchFamily="34" charset="0"/>
               </a:rPr>
-              <a:t>2/4/22 2:45 PM</a:t>
+              <a:t>2/16/22 2:06 PM</a:t>
             </a:fld>
             <a:endParaRPr lang="en-US" dirty="0">
               <a:latin typeface="Segoe UI" pitchFamily="34" charset="0"/>
@@ -6845,7 +6847,7 @@
           <a:p>
             <a:fld id="{386CE63F-9E7F-4C04-9D0D-FCA25A8E9E86}" type="datetime8">
               <a:rPr lang="en-US" smtClean="0"/>
-              <a:t>2/4/22 2:43 PM</a:t>
+              <a:t>2/16/22 2:02 PM</a:t>
             </a:fld>
             <a:endParaRPr lang="en-US" dirty="0"/>
           </a:p>
@@ -7212,7 +7214,7 @@
           <a:p>
             <a:fld id="{3619146B-24F9-441E-A368-DB3B5A84C1D4}" type="datetime8">
               <a:rPr lang="en-US" smtClean="0"/>
-              <a:t>2/4/22 2:43 PM</a:t>
+              <a:t>2/16/22 2:02 PM</a:t>
             </a:fld>
             <a:endParaRPr lang="en-US" dirty="0"/>
           </a:p>
@@ -7381,7 +7383,7 @@
           <a:p>
             <a:fld id="{9427A7F7-BB1E-479D-AFAA-B52F4D0C99F2}" type="datetime8">
               <a:rPr lang="en-US" smtClean="0"/>
-              <a:t>2/4/22 2:43 PM</a:t>
+              <a:t>2/16/22 2:02 PM</a:t>
             </a:fld>
             <a:endParaRPr lang="en-US" dirty="0"/>
           </a:p>
@@ -7550,7 +7552,7 @@
           <a:p>
             <a:fld id="{9427A7F7-BB1E-479D-AFAA-B52F4D0C99F2}" type="datetime8">
               <a:rPr lang="en-US" smtClean="0"/>
-              <a:t>2/4/22 2:44 PM</a:t>
+              <a:t>2/16/22 2:02 PM</a:t>
             </a:fld>
             <a:endParaRPr lang="en-US" dirty="0"/>
           </a:p>
@@ -7719,7 +7721,7 @@
           <a:p>
             <a:fld id="{9427A7F7-BB1E-479D-AFAA-B52F4D0C99F2}" type="datetime8">
               <a:rPr lang="en-US" smtClean="0"/>
-              <a:t>2/4/22 2:44 PM</a:t>
+              <a:t>2/16/22 2:05 PM</a:t>
             </a:fld>
             <a:endParaRPr lang="en-US" dirty="0"/>
           </a:p>
@@ -7888,7 +7890,7 @@
           <a:p>
             <a:fld id="{9427A7F7-BB1E-479D-AFAA-B52F4D0C99F2}" type="datetime8">
               <a:rPr lang="en-US" smtClean="0"/>
-              <a:t>2/4/22 2:45 PM</a:t>
+              <a:t>2/16/22 2:05 PM</a:t>
             </a:fld>
             <a:endParaRPr lang="en-US" dirty="0"/>
           </a:p>
@@ -8057,7 +8059,7 @@
           <a:p>
             <a:fld id="{9427A7F7-BB1E-479D-AFAA-B52F4D0C99F2}" type="datetime8">
               <a:rPr lang="en-US" smtClean="0"/>
-              <a:t>2/4/22 2:45 PM</a:t>
+              <a:t>2/16/22 2:02 PM</a:t>
             </a:fld>
             <a:endParaRPr lang="en-US" dirty="0"/>
           </a:p>
@@ -8226,7 +8228,7 @@
           <a:p>
             <a:fld id="{9427A7F7-BB1E-479D-AFAA-B52F4D0C99F2}" type="datetime8">
               <a:rPr lang="en-US" smtClean="0"/>
-              <a:t>2/4/22 2:43 PM</a:t>
+              <a:t>2/16/22 2:06 PM</a:t>
             </a:fld>
             <a:endParaRPr lang="en-US" dirty="0"/>
           </a:p>
@@ -8250,7 +8252,7 @@
             <a:fld id="{B4008EB6-D09E-4580-8CD6-DDB14511944F}" type="slidenum">
               <a:rPr lang="en-US" smtClean="0"/>
               <a:pPr/>
-              <a:t>7</a:t>
+              <a:t>8</a:t>
             </a:fld>
             <a:endParaRPr lang="en-US" dirty="0"/>
           </a:p>
@@ -17373,6 +17375,111 @@
 </file>
 
 <file path=ppt/slides/slide7.xml><?xml version="1.0" encoding="utf-8"?>
+<p:sld xmlns:a="http://schemas.openxmlformats.org/drawingml/2006/main" xmlns:r="http://schemas.openxmlformats.org/officeDocument/2006/relationships" xmlns:p="http://schemas.openxmlformats.org/presentationml/2006/main">
+  <p:cSld>
+    <p:spTree>
+      <p:nvGrpSpPr>
+        <p:cNvPr id="1" name=""/>
+        <p:cNvGrpSpPr/>
+        <p:nvPr/>
+      </p:nvGrpSpPr>
+      <p:grpSpPr>
+        <a:xfrm>
+          <a:off x="0" y="0"/>
+          <a:ext cx="0" cy="0"/>
+          <a:chOff x="0" y="0"/>
+          <a:chExt cx="0" cy="0"/>
+        </a:xfrm>
+      </p:grpSpPr>
+      <p:sp>
+        <p:nvSpPr>
+          <p:cNvPr id="3" name="Text Placeholder 2">
+            <a:extLst>
+              <a:ext uri="{FF2B5EF4-FFF2-40B4-BE49-F238E27FC236}">
+                <a16:creationId xmlns:a16="http://schemas.microsoft.com/office/drawing/2014/main" id="{7019C7D0-1A64-B848-9743-5D067933F3D8}"/>
+              </a:ext>
+            </a:extLst>
+          </p:cNvPr>
+          <p:cNvSpPr>
+            <a:spLocks noGrp="1"/>
+          </p:cNvSpPr>
+          <p:nvPr>
+            <p:ph type="body" sz="quarter" idx="10"/>
+          </p:nvPr>
+        </p:nvSpPr>
+        <p:spPr/>
+        <p:txBody>
+          <a:bodyPr/>
+          <a:lstStyle/>
+          <a:p>
+            <a:endParaRPr lang="en-US"/>
+          </a:p>
+        </p:txBody>
+      </p:sp>
+      <p:pic>
+        <p:nvPicPr>
+          <p:cNvPr id="1026" name="Picture 2">
+            <a:extLst>
+              <a:ext uri="{FF2B5EF4-FFF2-40B4-BE49-F238E27FC236}">
+                <a16:creationId xmlns:a16="http://schemas.microsoft.com/office/drawing/2014/main" id="{F3CC0D1F-AAD1-DA47-AEC9-E08C1506E8F2}"/>
+              </a:ext>
+            </a:extLst>
+          </p:cNvPr>
+          <p:cNvPicPr>
+            <a:picLocks noChangeAspect="1" noChangeArrowheads="1"/>
+          </p:cNvPicPr>
+          <p:nvPr/>
+        </p:nvPicPr>
+        <p:blipFill>
+          <a:blip r:embed="rId2">
+            <a:extLst>
+              <a:ext uri="{28A0092B-C50C-407E-A947-70E740481C1C}">
+                <a14:useLocalDpi xmlns:a14="http://schemas.microsoft.com/office/drawing/2010/main" val="0"/>
+              </a:ext>
+            </a:extLst>
+          </a:blip>
+          <a:srcRect/>
+          <a:stretch>
+            <a:fillRect/>
+          </a:stretch>
+        </p:blipFill>
+        <p:spPr bwMode="auto">
+          <a:xfrm>
+            <a:off x="0" y="871538"/>
+            <a:ext cx="12192000" cy="5113337"/>
+          </a:xfrm>
+          <a:prstGeom prst="rect">
+            <a:avLst/>
+          </a:prstGeom>
+          <a:noFill/>
+          <a:extLst>
+            <a:ext uri="{909E8E84-426E-40DD-AFC4-6F175D3DCCD1}">
+              <a14:hiddenFill xmlns:a14="http://schemas.microsoft.com/office/drawing/2010/main">
+                <a:solidFill>
+                  <a:srgbClr val="FFFFFF"/>
+                </a:solidFill>
+              </a14:hiddenFill>
+            </a:ext>
+          </a:extLst>
+        </p:spPr>
+      </p:pic>
+    </p:spTree>
+    <p:extLst>
+      <p:ext uri="{BB962C8B-B14F-4D97-AF65-F5344CB8AC3E}">
+        <p14:creationId xmlns:p14="http://schemas.microsoft.com/office/powerpoint/2010/main" val="1908049961"/>
+      </p:ext>
+    </p:extLst>
+  </p:cSld>
+  <p:clrMapOvr>
+    <a:masterClrMapping/>
+  </p:clrMapOvr>
+  <p:transition>
+    <p:fade/>
+  </p:transition>
+</p:sld>
+</file>
+
+<file path=ppt/slides/slide8.xml><?xml version="1.0" encoding="utf-8"?>
 <p:sld xmlns:a="http://schemas.openxmlformats.org/drawingml/2006/main" xmlns:r="http://schemas.openxmlformats.org/officeDocument/2006/relationships" xmlns:p="http://schemas.openxmlformats.org/presentationml/2006/main">
   <p:cSld>
     <p:spTree>
@@ -19069,6 +19176,21 @@
 </file>
 
 <file path=customXml/item1.xml><?xml version="1.0" encoding="utf-8"?>
+<p:properties xmlns:p="http://schemas.microsoft.com/office/2006/metadata/properties" xmlns:xsi="http://www.w3.org/2001/XMLSchema-instance" xmlns:pc="http://schemas.microsoft.com/office/infopath/2007/PartnerControls">
+  <documentManagement/>
+</p:properties>
+</file>
+
+<file path=customXml/item2.xml><?xml version="1.0" encoding="utf-8"?>
+<?mso-contentType ?>
+<FormTemplates xmlns="http://schemas.microsoft.com/sharepoint/v3/contenttype/forms">
+  <Display>DocumentLibraryForm</Display>
+  <Edit>DocumentLibraryForm</Edit>
+  <New>DocumentLibraryForm</New>
+</FormTemplates>
+</file>
+
+<file path=customXml/item3.xml><?xml version="1.0" encoding="utf-8"?>
 <ct:contentTypeSchema xmlns:ct="http://schemas.microsoft.com/office/2006/metadata/contentType" xmlns:ma="http://schemas.microsoft.com/office/2006/metadata/properties/metaAttributes" ct:_="" ma:_="" ma:contentTypeName="Document" ma:contentTypeID="0x0101001111ADC00254DE41A04749877178181E" ma:contentTypeVersion="11" ma:contentTypeDescription="Create a new document." ma:contentTypeScope="" ma:versionID="22b0ffa551a8eb55f619d65d31d8f057">
   <xsd:schema xmlns:xsd="http://www.w3.org/2001/XMLSchema" xmlns:xs="http://www.w3.org/2001/XMLSchema" xmlns:p="http://schemas.microsoft.com/office/2006/metadata/properties" xmlns:ns3="41702965-b95a-4379-b46a-5d931a00bdfb" xmlns:ns4="aa7f1ac7-8bbb-4f15-8963-cd0d4c8062ce" targetNamespace="http://schemas.microsoft.com/office/2006/metadata/properties" ma:root="true" ma:fieldsID="c4bb29fa7dec31b6e89dd9e69c6d67c7" ns3:_="" ns4:_="">
     <xsd:import namespace="41702965-b95a-4379-b46a-5d931a00bdfb"/>
@@ -19279,22 +19401,32 @@
 </ct:contentTypeSchema>
 </file>
 
-<file path=customXml/item2.xml><?xml version="1.0" encoding="utf-8"?>
-<?mso-contentType ?>
-<FormTemplates xmlns="http://schemas.microsoft.com/sharepoint/v3/contenttype/forms">
-  <Display>DocumentLibraryForm</Display>
-  <Edit>DocumentLibraryForm</Edit>
-  <New>DocumentLibraryForm</New>
-</FormTemplates>
+<file path=customXml/itemProps1.xml><?xml version="1.0" encoding="utf-8"?>
+<ds:datastoreItem xmlns:ds="http://schemas.openxmlformats.org/officeDocument/2006/customXml" ds:itemID="{556FB2F1-418F-4174-8BE9-14A4D3AA3278}">
+  <ds:schemaRefs>
+    <ds:schemaRef ds:uri="aa7f1ac7-8bbb-4f15-8963-cd0d4c8062ce"/>
+    <ds:schemaRef ds:uri="41702965-b95a-4379-b46a-5d931a00bdfb"/>
+    <ds:schemaRef ds:uri="http://purl.org/dc/elements/1.1/"/>
+    <ds:schemaRef ds:uri="http://www.w3.org/XML/1998/namespace"/>
+    <ds:schemaRef ds:uri="http://schemas.openxmlformats.org/package/2006/metadata/core-properties"/>
+    <ds:schemaRef ds:uri="http://purl.org/dc/terms/"/>
+    <ds:schemaRef ds:uri="http://schemas.microsoft.com/office/2006/documentManagement/types"/>
+    <ds:schemaRef ds:uri="http://schemas.microsoft.com/office/infopath/2007/PartnerControls"/>
+    <ds:schemaRef ds:uri="http://schemas.microsoft.com/office/2006/metadata/properties"/>
+    <ds:schemaRef ds:uri="http://purl.org/dc/dcmitype/"/>
+  </ds:schemaRefs>
+</ds:datastoreItem>
 </file>
 
-<file path=customXml/item3.xml><?xml version="1.0" encoding="utf-8"?>
-<p:properties xmlns:p="http://schemas.microsoft.com/office/2006/metadata/properties" xmlns:xsi="http://www.w3.org/2001/XMLSchema-instance" xmlns:pc="http://schemas.microsoft.com/office/infopath/2007/PartnerControls">
-  <documentManagement/>
-</p:properties>
+<file path=customXml/itemProps2.xml><?xml version="1.0" encoding="utf-8"?>
+<ds:datastoreItem xmlns:ds="http://schemas.openxmlformats.org/officeDocument/2006/customXml" ds:itemID="{4F8864C9-26CB-45F0-ADBB-40483FA6D018}">
+  <ds:schemaRefs>
+    <ds:schemaRef ds:uri="http://schemas.microsoft.com/sharepoint/v3/contenttype/forms"/>
+  </ds:schemaRefs>
+</ds:datastoreItem>
 </file>
 
-<file path=customXml/itemProps1.xml><?xml version="1.0" encoding="utf-8"?>
+<file path=customXml/itemProps3.xml><?xml version="1.0" encoding="utf-8"?>
 <ds:datastoreItem xmlns:ds="http://schemas.openxmlformats.org/officeDocument/2006/customXml" ds:itemID="{D8B7D216-D964-4CB8-9E88-41D30A587B00}">
   <ds:schemaRefs>
     <ds:schemaRef ds:uri="http://schemas.microsoft.com/office/2006/metadata/contentType"/>
@@ -19313,31 +19445,6 @@
 </ds:datastoreItem>
 </file>
 
-<file path=customXml/itemProps2.xml><?xml version="1.0" encoding="utf-8"?>
-<ds:datastoreItem xmlns:ds="http://schemas.openxmlformats.org/officeDocument/2006/customXml" ds:itemID="{4F8864C9-26CB-45F0-ADBB-40483FA6D018}">
-  <ds:schemaRefs>
-    <ds:schemaRef ds:uri="http://schemas.microsoft.com/sharepoint/v3/contenttype/forms"/>
-  </ds:schemaRefs>
-</ds:datastoreItem>
-</file>
-
-<file path=customXml/itemProps3.xml><?xml version="1.0" encoding="utf-8"?>
-<ds:datastoreItem xmlns:ds="http://schemas.openxmlformats.org/officeDocument/2006/customXml" ds:itemID="{556FB2F1-418F-4174-8BE9-14A4D3AA3278}">
-  <ds:schemaRefs>
-    <ds:schemaRef ds:uri="aa7f1ac7-8bbb-4f15-8963-cd0d4c8062ce"/>
-    <ds:schemaRef ds:uri="41702965-b95a-4379-b46a-5d931a00bdfb"/>
-    <ds:schemaRef ds:uri="http://purl.org/dc/elements/1.1/"/>
-    <ds:schemaRef ds:uri="http://www.w3.org/XML/1998/namespace"/>
-    <ds:schemaRef ds:uri="http://schemas.openxmlformats.org/package/2006/metadata/core-properties"/>
-    <ds:schemaRef ds:uri="http://purl.org/dc/terms/"/>
-    <ds:schemaRef ds:uri="http://schemas.microsoft.com/office/2006/documentManagement/types"/>
-    <ds:schemaRef ds:uri="http://schemas.microsoft.com/office/infopath/2007/PartnerControls"/>
-    <ds:schemaRef ds:uri="http://schemas.microsoft.com/office/2006/metadata/properties"/>
-    <ds:schemaRef ds:uri="http://purl.org/dc/dcmitype/"/>
-  </ds:schemaRefs>
-</ds:datastoreItem>
-</file>
-
 <file path=docMetadata/LabelInfo.xml><?xml version="1.0" encoding="utf-8"?>
 <clbl:labelList xmlns:clbl="http://schemas.microsoft.com/office/2020/mipLabelMetadata">
   <clbl:label id="{f42aa342-8706-4288-bd11-ebb85995028c}" enabled="1" method="Standard" siteId="{72f988bf-86f1-41af-91ab-2d7cd011db47}" removed="0"/>

</xml_diff>

<commit_message>
Modified - Updated encryption image
</commit_message>
<xml_diff>
--- a/8. Encryption in Azure/Artifacts/Virtual Machine Encryption.pptx
+++ b/8. Encryption in Azure/Artifacts/Virtual Machine Encryption.pptx
@@ -6569,7 +6569,7 @@
               <a:rPr lang="en-US" smtClean="0">
                 <a:latin typeface="Segoe UI" pitchFamily="34" charset="0"/>
               </a:rPr>
-              <a:t>2/16/22 2:06 PM</a:t>
+              <a:t>2/16/22 6:01 PM</a:t>
             </a:fld>
             <a:endParaRPr lang="en-US" dirty="0">
               <a:latin typeface="Segoe UI" pitchFamily="34" charset="0"/>
@@ -6847,7 +6847,7 @@
           <a:p>
             <a:fld id="{386CE63F-9E7F-4C04-9D0D-FCA25A8E9E86}" type="datetime8">
               <a:rPr lang="en-US" smtClean="0"/>
-              <a:t>2/16/22 2:02 PM</a:t>
+              <a:t>2/16/22 6:01 PM</a:t>
             </a:fld>
             <a:endParaRPr lang="en-US" dirty="0"/>
           </a:p>
@@ -7214,7 +7214,7 @@
           <a:p>
             <a:fld id="{3619146B-24F9-441E-A368-DB3B5A84C1D4}" type="datetime8">
               <a:rPr lang="en-US" smtClean="0"/>
-              <a:t>2/16/22 2:02 PM</a:t>
+              <a:t>2/16/22 6:01 PM</a:t>
             </a:fld>
             <a:endParaRPr lang="en-US" dirty="0"/>
           </a:p>
@@ -7383,7 +7383,7 @@
           <a:p>
             <a:fld id="{9427A7F7-BB1E-479D-AFAA-B52F4D0C99F2}" type="datetime8">
               <a:rPr lang="en-US" smtClean="0"/>
-              <a:t>2/16/22 2:02 PM</a:t>
+              <a:t>2/16/22 6:01 PM</a:t>
             </a:fld>
             <a:endParaRPr lang="en-US" dirty="0"/>
           </a:p>
@@ -7552,7 +7552,7 @@
           <a:p>
             <a:fld id="{9427A7F7-BB1E-479D-AFAA-B52F4D0C99F2}" type="datetime8">
               <a:rPr lang="en-US" smtClean="0"/>
-              <a:t>2/16/22 2:02 PM</a:t>
+              <a:t>2/16/22 6:01 PM</a:t>
             </a:fld>
             <a:endParaRPr lang="en-US" dirty="0"/>
           </a:p>
@@ -7721,7 +7721,7 @@
           <a:p>
             <a:fld id="{9427A7F7-BB1E-479D-AFAA-B52F4D0C99F2}" type="datetime8">
               <a:rPr lang="en-US" smtClean="0"/>
-              <a:t>2/16/22 2:05 PM</a:t>
+              <a:t>2/16/22 6:01 PM</a:t>
             </a:fld>
             <a:endParaRPr lang="en-US" dirty="0"/>
           </a:p>
@@ -7890,7 +7890,7 @@
           <a:p>
             <a:fld id="{9427A7F7-BB1E-479D-AFAA-B52F4D0C99F2}" type="datetime8">
               <a:rPr lang="en-US" smtClean="0"/>
-              <a:t>2/16/22 2:05 PM</a:t>
+              <a:t>2/16/22 6:01 PM</a:t>
             </a:fld>
             <a:endParaRPr lang="en-US" dirty="0"/>
           </a:p>
@@ -8059,7 +8059,7 @@
           <a:p>
             <a:fld id="{9427A7F7-BB1E-479D-AFAA-B52F4D0C99F2}" type="datetime8">
               <a:rPr lang="en-US" smtClean="0"/>
-              <a:t>2/16/22 2:02 PM</a:t>
+              <a:t>2/16/22 6:01 PM</a:t>
             </a:fld>
             <a:endParaRPr lang="en-US" dirty="0"/>
           </a:p>
@@ -8228,7 +8228,7 @@
           <a:p>
             <a:fld id="{9427A7F7-BB1E-479D-AFAA-B52F4D0C99F2}" type="datetime8">
               <a:rPr lang="en-US" smtClean="0"/>
-              <a:t>2/16/22 2:06 PM</a:t>
+              <a:t>2/16/22 6:01 PM</a:t>
             </a:fld>
             <a:endParaRPr lang="en-US" dirty="0"/>
           </a:p>
@@ -17391,76 +17391,34 @@
           <a:chExt cx="0" cy="0"/>
         </a:xfrm>
       </p:grpSpPr>
-      <p:sp>
-        <p:nvSpPr>
-          <p:cNvPr id="3" name="Text Placeholder 2">
+      <p:pic>
+        <p:nvPicPr>
+          <p:cNvPr id="2" name="Picture 1">
             <a:extLst>
               <a:ext uri="{FF2B5EF4-FFF2-40B4-BE49-F238E27FC236}">
-                <a16:creationId xmlns:a16="http://schemas.microsoft.com/office/drawing/2014/main" id="{7019C7D0-1A64-B848-9743-5D067933F3D8}"/>
-              </a:ext>
-            </a:extLst>
-          </p:cNvPr>
-          <p:cNvSpPr>
-            <a:spLocks noGrp="1"/>
-          </p:cNvSpPr>
-          <p:nvPr>
-            <p:ph type="body" sz="quarter" idx="10"/>
-          </p:nvPr>
-        </p:nvSpPr>
-        <p:spPr/>
-        <p:txBody>
-          <a:bodyPr/>
-          <a:lstStyle/>
-          <a:p>
-            <a:endParaRPr lang="en-US"/>
-          </a:p>
-        </p:txBody>
-      </p:sp>
-      <p:pic>
-        <p:nvPicPr>
-          <p:cNvPr id="1026" name="Picture 2">
-            <a:extLst>
-              <a:ext uri="{FF2B5EF4-FFF2-40B4-BE49-F238E27FC236}">
-                <a16:creationId xmlns:a16="http://schemas.microsoft.com/office/drawing/2014/main" id="{F3CC0D1F-AAD1-DA47-AEC9-E08C1506E8F2}"/>
+                <a16:creationId xmlns:a16="http://schemas.microsoft.com/office/drawing/2014/main" id="{01D330FA-D1B5-AF40-A1F4-71A4B24D491E}"/>
               </a:ext>
             </a:extLst>
           </p:cNvPr>
           <p:cNvPicPr>
-            <a:picLocks noChangeAspect="1" noChangeArrowheads="1"/>
+            <a:picLocks noChangeAspect="1"/>
           </p:cNvPicPr>
           <p:nvPr/>
         </p:nvPicPr>
         <p:blipFill>
-          <a:blip r:embed="rId2">
-            <a:extLst>
-              <a:ext uri="{28A0092B-C50C-407E-A947-70E740481C1C}">
-                <a14:useLocalDpi xmlns:a14="http://schemas.microsoft.com/office/drawing/2010/main" val="0"/>
-              </a:ext>
-            </a:extLst>
-          </a:blip>
-          <a:srcRect/>
+          <a:blip r:embed="rId2"/>
           <a:stretch>
             <a:fillRect/>
           </a:stretch>
         </p:blipFill>
-        <p:spPr bwMode="auto">
+        <p:spPr>
           <a:xfrm>
-            <a:off x="0" y="871538"/>
-            <a:ext cx="12192000" cy="5113337"/>
+            <a:off x="1073150" y="1276350"/>
+            <a:ext cx="10045700" cy="4305300"/>
           </a:xfrm>
           <a:prstGeom prst="rect">
             <a:avLst/>
           </a:prstGeom>
-          <a:noFill/>
-          <a:extLst>
-            <a:ext uri="{909E8E84-426E-40DD-AFC4-6F175D3DCCD1}">
-              <a14:hiddenFill xmlns:a14="http://schemas.microsoft.com/office/drawing/2010/main">
-                <a:solidFill>
-                  <a:srgbClr val="FFFFFF"/>
-                </a:solidFill>
-              </a14:hiddenFill>
-            </a:ext>
-          </a:extLst>
         </p:spPr>
       </p:pic>
     </p:spTree>
@@ -19176,18 +19134,18 @@
 </file>
 
 <file path=customXml/item1.xml><?xml version="1.0" encoding="utf-8"?>
-<p:properties xmlns:p="http://schemas.microsoft.com/office/2006/metadata/properties" xmlns:xsi="http://www.w3.org/2001/XMLSchema-instance" xmlns:pc="http://schemas.microsoft.com/office/infopath/2007/PartnerControls">
-  <documentManagement/>
-</p:properties>
-</file>
-
-<file path=customXml/item2.xml><?xml version="1.0" encoding="utf-8"?>
 <?mso-contentType ?>
 <FormTemplates xmlns="http://schemas.microsoft.com/sharepoint/v3/contenttype/forms">
   <Display>DocumentLibraryForm</Display>
   <Edit>DocumentLibraryForm</Edit>
   <New>DocumentLibraryForm</New>
 </FormTemplates>
+</file>
+
+<file path=customXml/item2.xml><?xml version="1.0" encoding="utf-8"?>
+<p:properties xmlns:p="http://schemas.microsoft.com/office/2006/metadata/properties" xmlns:xsi="http://www.w3.org/2001/XMLSchema-instance" xmlns:pc="http://schemas.microsoft.com/office/infopath/2007/PartnerControls">
+  <documentManagement/>
+</p:properties>
 </file>
 
 <file path=customXml/item3.xml><?xml version="1.0" encoding="utf-8"?>
@@ -19402,6 +19360,14 @@
 </file>
 
 <file path=customXml/itemProps1.xml><?xml version="1.0" encoding="utf-8"?>
+<ds:datastoreItem xmlns:ds="http://schemas.openxmlformats.org/officeDocument/2006/customXml" ds:itemID="{4F8864C9-26CB-45F0-ADBB-40483FA6D018}">
+  <ds:schemaRefs>
+    <ds:schemaRef ds:uri="http://schemas.microsoft.com/sharepoint/v3/contenttype/forms"/>
+  </ds:schemaRefs>
+</ds:datastoreItem>
+</file>
+
+<file path=customXml/itemProps2.xml><?xml version="1.0" encoding="utf-8"?>
 <ds:datastoreItem xmlns:ds="http://schemas.openxmlformats.org/officeDocument/2006/customXml" ds:itemID="{556FB2F1-418F-4174-8BE9-14A4D3AA3278}">
   <ds:schemaRefs>
     <ds:schemaRef ds:uri="aa7f1ac7-8bbb-4f15-8963-cd0d4c8062ce"/>
@@ -19414,14 +19380,6 @@
     <ds:schemaRef ds:uri="http://schemas.microsoft.com/office/infopath/2007/PartnerControls"/>
     <ds:schemaRef ds:uri="http://schemas.microsoft.com/office/2006/metadata/properties"/>
     <ds:schemaRef ds:uri="http://purl.org/dc/dcmitype/"/>
-  </ds:schemaRefs>
-</ds:datastoreItem>
-</file>
-
-<file path=customXml/itemProps2.xml><?xml version="1.0" encoding="utf-8"?>
-<ds:datastoreItem xmlns:ds="http://schemas.openxmlformats.org/officeDocument/2006/customXml" ds:itemID="{4F8864C9-26CB-45F0-ADBB-40483FA6D018}">
-  <ds:schemaRefs>
-    <ds:schemaRef ds:uri="http://schemas.microsoft.com/sharepoint/v3/contenttype/forms"/>
   </ds:schemaRefs>
 </ds:datastoreItem>
 </file>

</xml_diff>

<commit_message>
Modified - Updated envelop encryption image
</commit_message>
<xml_diff>
--- a/8. Encryption in Azure/Artifacts/Virtual Machine Encryption.pptx
+++ b/8. Encryption in Azure/Artifacts/Virtual Machine Encryption.pptx
@@ -6569,7 +6569,7 @@
               <a:rPr lang="en-US" smtClean="0">
                 <a:latin typeface="Segoe UI" pitchFamily="34" charset="0"/>
               </a:rPr>
-              <a:t>2/16/22 6:01 PM</a:t>
+              <a:t>2/16/22 6:04 PM</a:t>
             </a:fld>
             <a:endParaRPr lang="en-US" dirty="0">
               <a:latin typeface="Segoe UI" pitchFamily="34" charset="0"/>
@@ -6847,7 +6847,7 @@
           <a:p>
             <a:fld id="{386CE63F-9E7F-4C04-9D0D-FCA25A8E9E86}" type="datetime8">
               <a:rPr lang="en-US" smtClean="0"/>
-              <a:t>2/16/22 6:01 PM</a:t>
+              <a:t>2/16/22 6:04 PM</a:t>
             </a:fld>
             <a:endParaRPr lang="en-US" dirty="0"/>
           </a:p>
@@ -7214,7 +7214,7 @@
           <a:p>
             <a:fld id="{3619146B-24F9-441E-A368-DB3B5A84C1D4}" type="datetime8">
               <a:rPr lang="en-US" smtClean="0"/>
-              <a:t>2/16/22 6:01 PM</a:t>
+              <a:t>2/16/22 6:04 PM</a:t>
             </a:fld>
             <a:endParaRPr lang="en-US" dirty="0"/>
           </a:p>
@@ -7383,7 +7383,7 @@
           <a:p>
             <a:fld id="{9427A7F7-BB1E-479D-AFAA-B52F4D0C99F2}" type="datetime8">
               <a:rPr lang="en-US" smtClean="0"/>
-              <a:t>2/16/22 6:01 PM</a:t>
+              <a:t>2/16/22 6:04 PM</a:t>
             </a:fld>
             <a:endParaRPr lang="en-US" dirty="0"/>
           </a:p>
@@ -7552,7 +7552,7 @@
           <a:p>
             <a:fld id="{9427A7F7-BB1E-479D-AFAA-B52F4D0C99F2}" type="datetime8">
               <a:rPr lang="en-US" smtClean="0"/>
-              <a:t>2/16/22 6:01 PM</a:t>
+              <a:t>2/16/22 6:04 PM</a:t>
             </a:fld>
             <a:endParaRPr lang="en-US" dirty="0"/>
           </a:p>
@@ -7721,7 +7721,7 @@
           <a:p>
             <a:fld id="{9427A7F7-BB1E-479D-AFAA-B52F4D0C99F2}" type="datetime8">
               <a:rPr lang="en-US" smtClean="0"/>
-              <a:t>2/16/22 6:01 PM</a:t>
+              <a:t>2/16/22 6:04 PM</a:t>
             </a:fld>
             <a:endParaRPr lang="en-US" dirty="0"/>
           </a:p>
@@ -7890,7 +7890,7 @@
           <a:p>
             <a:fld id="{9427A7F7-BB1E-479D-AFAA-B52F4D0C99F2}" type="datetime8">
               <a:rPr lang="en-US" smtClean="0"/>
-              <a:t>2/16/22 6:01 PM</a:t>
+              <a:t>2/16/22 6:04 PM</a:t>
             </a:fld>
             <a:endParaRPr lang="en-US" dirty="0"/>
           </a:p>
@@ -8059,7 +8059,7 @@
           <a:p>
             <a:fld id="{9427A7F7-BB1E-479D-AFAA-B52F4D0C99F2}" type="datetime8">
               <a:rPr lang="en-US" smtClean="0"/>
-              <a:t>2/16/22 6:01 PM</a:t>
+              <a:t>2/16/22 6:04 PM</a:t>
             </a:fld>
             <a:endParaRPr lang="en-US" dirty="0"/>
           </a:p>
@@ -8146,6 +8146,187 @@
           <a:bodyPr/>
           <a:lstStyle/>
           <a:p>
+            <a:endParaRPr lang="en-US" dirty="0"/>
+          </a:p>
+        </p:txBody>
+      </p:sp>
+      <p:sp>
+        <p:nvSpPr>
+          <p:cNvPr id="4" name="Header Placeholder 3"/>
+          <p:cNvSpPr>
+            <a:spLocks noGrp="1"/>
+          </p:cNvSpPr>
+          <p:nvPr>
+            <p:ph type="hdr" sz="quarter"/>
+          </p:nvPr>
+        </p:nvSpPr>
+        <p:spPr/>
+        <p:txBody>
+          <a:bodyPr/>
+          <a:lstStyle/>
+          <a:p>
+            <a:endParaRPr lang="en-US" dirty="0"/>
+          </a:p>
+        </p:txBody>
+      </p:sp>
+      <p:sp>
+        <p:nvSpPr>
+          <p:cNvPr id="5" name="Footer Placeholder 4"/>
+          <p:cNvSpPr>
+            <a:spLocks noGrp="1"/>
+          </p:cNvSpPr>
+          <p:nvPr>
+            <p:ph type="ftr" sz="quarter" idx="4"/>
+          </p:nvPr>
+        </p:nvSpPr>
+        <p:spPr/>
+        <p:txBody>
+          <a:bodyPr/>
+          <a:lstStyle/>
+          <a:p>
+            <a:pPr defTabSz="914099" eaLnBrk="0" hangingPunct="0"/>
+            <a:r>
+              <a:rPr lang="en-US" sz="400">
+                <a:gradFill>
+                  <a:gsLst>
+                    <a:gs pos="0">
+                      <a:prstClr val="black"/>
+                    </a:gs>
+                    <a:gs pos="100000">
+                      <a:prstClr val="black"/>
+                    </a:gs>
+                  </a:gsLst>
+                  <a:lin ang="5400000" scaled="0"/>
+                </a:gradFill>
+                <a:latin typeface="Segoe UI" pitchFamily="34" charset="0"/>
+                <a:ea typeface="Segoe UI" pitchFamily="34" charset="0"/>
+                <a:cs typeface="Segoe UI" pitchFamily="34" charset="0"/>
+              </a:rPr>
+              <a:t>© Microsoft Corporation. All rights reserved. MICROSOFT MAKES NO WARRANTIES, EXPRESS, IMPLIED OR STATUTORY, AS TO THE INFORMATION IN THIS PRESENTATION.</a:t>
+            </a:r>
+            <a:endParaRPr lang="en-US" sz="400" dirty="0">
+              <a:gradFill>
+                <a:gsLst>
+                  <a:gs pos="0">
+                    <a:prstClr val="black"/>
+                  </a:gs>
+                  <a:gs pos="100000">
+                    <a:prstClr val="black"/>
+                  </a:gs>
+                </a:gsLst>
+                <a:lin ang="5400000" scaled="0"/>
+              </a:gradFill>
+              <a:latin typeface="Segoe UI" pitchFamily="34" charset="0"/>
+              <a:ea typeface="Segoe UI" pitchFamily="34" charset="0"/>
+              <a:cs typeface="Segoe UI" pitchFamily="34" charset="0"/>
+            </a:endParaRPr>
+          </a:p>
+        </p:txBody>
+      </p:sp>
+      <p:sp>
+        <p:nvSpPr>
+          <p:cNvPr id="6" name="Date Placeholder 5"/>
+          <p:cNvSpPr>
+            <a:spLocks noGrp="1"/>
+          </p:cNvSpPr>
+          <p:nvPr>
+            <p:ph type="dt" idx="1"/>
+          </p:nvPr>
+        </p:nvSpPr>
+        <p:spPr/>
+        <p:txBody>
+          <a:bodyPr/>
+          <a:lstStyle/>
+          <a:p>
+            <a:fld id="{386CE63F-9E7F-4C04-9D0D-FCA25A8E9E86}" type="datetime8">
+              <a:rPr lang="en-US" smtClean="0"/>
+              <a:t>2/16/22 6:04 PM</a:t>
+            </a:fld>
+            <a:endParaRPr lang="en-US" dirty="0"/>
+          </a:p>
+        </p:txBody>
+      </p:sp>
+      <p:sp>
+        <p:nvSpPr>
+          <p:cNvPr id="7" name="Slide Number Placeholder 6"/>
+          <p:cNvSpPr>
+            <a:spLocks noGrp="1"/>
+          </p:cNvSpPr>
+          <p:nvPr>
+            <p:ph type="sldNum" sz="quarter" idx="5"/>
+          </p:nvPr>
+        </p:nvSpPr>
+        <p:spPr/>
+        <p:txBody>
+          <a:bodyPr/>
+          <a:lstStyle/>
+          <a:p>
+            <a:fld id="{B4008EB6-D09E-4580-8CD6-DDB14511944F}" type="slidenum">
+              <a:rPr lang="en-US" smtClean="0"/>
+              <a:pPr/>
+              <a:t>7</a:t>
+            </a:fld>
+            <a:endParaRPr lang="en-US" dirty="0"/>
+          </a:p>
+        </p:txBody>
+      </p:sp>
+    </p:spTree>
+    <p:extLst>
+      <p:ext uri="{BB962C8B-B14F-4D97-AF65-F5344CB8AC3E}">
+        <p14:creationId xmlns:p14="http://schemas.microsoft.com/office/powerpoint/2010/main" val="1646574856"/>
+      </p:ext>
+    </p:extLst>
+  </p:cSld>
+  <p:clrMapOvr>
+    <a:masterClrMapping/>
+  </p:clrMapOvr>
+</p:notes>
+</file>
+
+<file path=ppt/notesSlides/notesSlide8.xml><?xml version="1.0" encoding="utf-8"?>
+<p:notes xmlns:a="http://schemas.openxmlformats.org/drawingml/2006/main" xmlns:r="http://schemas.openxmlformats.org/officeDocument/2006/relationships" xmlns:p="http://schemas.openxmlformats.org/presentationml/2006/main">
+  <p:cSld>
+    <p:spTree>
+      <p:nvGrpSpPr>
+        <p:cNvPr id="1" name=""/>
+        <p:cNvGrpSpPr/>
+        <p:nvPr/>
+      </p:nvGrpSpPr>
+      <p:grpSpPr>
+        <a:xfrm>
+          <a:off x="0" y="0"/>
+          <a:ext cx="0" cy="0"/>
+          <a:chOff x="0" y="0"/>
+          <a:chExt cx="0" cy="0"/>
+        </a:xfrm>
+      </p:grpSpPr>
+      <p:sp>
+        <p:nvSpPr>
+          <p:cNvPr id="2" name="Slide Image Placeholder 1"/>
+          <p:cNvSpPr>
+            <a:spLocks noGrp="1" noRot="1" noChangeAspect="1"/>
+          </p:cNvSpPr>
+          <p:nvPr>
+            <p:ph type="sldImg"/>
+          </p:nvPr>
+        </p:nvSpPr>
+        <p:spPr/>
+      </p:sp>
+      <p:sp>
+        <p:nvSpPr>
+          <p:cNvPr id="3" name="Notes Placeholder 2"/>
+          <p:cNvSpPr>
+            <a:spLocks noGrp="1"/>
+          </p:cNvSpPr>
+          <p:nvPr>
+            <p:ph type="body" idx="1"/>
+          </p:nvPr>
+        </p:nvSpPr>
+        <p:spPr/>
+        <p:txBody>
+          <a:bodyPr/>
+          <a:lstStyle/>
+          <a:p>
             <a:pPr marL="171450" indent="-171450">
               <a:buFont typeface="Arial" panose="020B0604020202020204" pitchFamily="34" charset="0"/>
               <a:buChar char="•"/>
@@ -8228,7 +8409,7 @@
           <a:p>
             <a:fld id="{9427A7F7-BB1E-479D-AFAA-B52F4D0C99F2}" type="datetime8">
               <a:rPr lang="en-US" smtClean="0"/>
-              <a:t>2/16/22 6:01 PM</a:t>
+              <a:t>2/16/22 6:04 PM</a:t>
             </a:fld>
             <a:endParaRPr lang="en-US" dirty="0"/>
           </a:p>
@@ -16200,10 +16381,10 @@
       </p:sp>
       <p:pic>
         <p:nvPicPr>
-          <p:cNvPr id="5" name="Picture 4">
+          <p:cNvPr id="3" name="Picture 2">
             <a:extLst>
               <a:ext uri="{FF2B5EF4-FFF2-40B4-BE49-F238E27FC236}">
-                <a16:creationId xmlns:a16="http://schemas.microsoft.com/office/drawing/2014/main" id="{BAB6D6EB-DA44-2745-B937-5739DE8DBE47}"/>
+                <a16:creationId xmlns:a16="http://schemas.microsoft.com/office/drawing/2014/main" id="{4436AB49-2952-5148-9173-B6018A7F6EB4}"/>
               </a:ext>
             </a:extLst>
           </p:cNvPr>
@@ -16220,8 +16401,8 @@
         </p:blipFill>
         <p:spPr>
           <a:xfrm>
-            <a:off x="1950875" y="1387928"/>
-            <a:ext cx="6769100" cy="4572000"/>
+            <a:off x="2324588" y="1601755"/>
+            <a:ext cx="7378700" cy="4572000"/>
           </a:xfrm>
           <a:prstGeom prst="rect">
             <a:avLst/>
@@ -17406,7 +17587,7 @@
           <p:nvPr/>
         </p:nvPicPr>
         <p:blipFill>
-          <a:blip r:embed="rId2"/>
+          <a:blip r:embed="rId3"/>
           <a:stretch>
             <a:fillRect/>
           </a:stretch>
@@ -19134,18 +19315,18 @@
 </file>
 
 <file path=customXml/item1.xml><?xml version="1.0" encoding="utf-8"?>
+<p:properties xmlns:p="http://schemas.microsoft.com/office/2006/metadata/properties" xmlns:xsi="http://www.w3.org/2001/XMLSchema-instance" xmlns:pc="http://schemas.microsoft.com/office/infopath/2007/PartnerControls">
+  <documentManagement/>
+</p:properties>
+</file>
+
+<file path=customXml/item2.xml><?xml version="1.0" encoding="utf-8"?>
 <?mso-contentType ?>
 <FormTemplates xmlns="http://schemas.microsoft.com/sharepoint/v3/contenttype/forms">
   <Display>DocumentLibraryForm</Display>
   <Edit>DocumentLibraryForm</Edit>
   <New>DocumentLibraryForm</New>
 </FormTemplates>
-</file>
-
-<file path=customXml/item2.xml><?xml version="1.0" encoding="utf-8"?>
-<p:properties xmlns:p="http://schemas.microsoft.com/office/2006/metadata/properties" xmlns:xsi="http://www.w3.org/2001/XMLSchema-instance" xmlns:pc="http://schemas.microsoft.com/office/infopath/2007/PartnerControls">
-  <documentManagement/>
-</p:properties>
 </file>
 
 <file path=customXml/item3.xml><?xml version="1.0" encoding="utf-8"?>
@@ -19360,14 +19541,6 @@
 </file>
 
 <file path=customXml/itemProps1.xml><?xml version="1.0" encoding="utf-8"?>
-<ds:datastoreItem xmlns:ds="http://schemas.openxmlformats.org/officeDocument/2006/customXml" ds:itemID="{4F8864C9-26CB-45F0-ADBB-40483FA6D018}">
-  <ds:schemaRefs>
-    <ds:schemaRef ds:uri="http://schemas.microsoft.com/sharepoint/v3/contenttype/forms"/>
-  </ds:schemaRefs>
-</ds:datastoreItem>
-</file>
-
-<file path=customXml/itemProps2.xml><?xml version="1.0" encoding="utf-8"?>
 <ds:datastoreItem xmlns:ds="http://schemas.openxmlformats.org/officeDocument/2006/customXml" ds:itemID="{556FB2F1-418F-4174-8BE9-14A4D3AA3278}">
   <ds:schemaRefs>
     <ds:schemaRef ds:uri="aa7f1ac7-8bbb-4f15-8963-cd0d4c8062ce"/>
@@ -19380,6 +19553,14 @@
     <ds:schemaRef ds:uri="http://schemas.microsoft.com/office/infopath/2007/PartnerControls"/>
     <ds:schemaRef ds:uri="http://schemas.microsoft.com/office/2006/metadata/properties"/>
     <ds:schemaRef ds:uri="http://purl.org/dc/dcmitype/"/>
+  </ds:schemaRefs>
+</ds:datastoreItem>
+</file>
+
+<file path=customXml/itemProps2.xml><?xml version="1.0" encoding="utf-8"?>
+<ds:datastoreItem xmlns:ds="http://schemas.openxmlformats.org/officeDocument/2006/customXml" ds:itemID="{4F8864C9-26CB-45F0-ADBB-40483FA6D018}">
+  <ds:schemaRefs>
+    <ds:schemaRef ds:uri="http://schemas.microsoft.com/sharepoint/v3/contenttype/forms"/>
   </ds:schemaRefs>
 </ds:datastoreItem>
 </file>

</xml_diff>